<commit_message>
Minor edits in the PPT
</commit_message>
<xml_diff>
--- a/AI_Challenge.pptx
+++ b/AI_Challenge.pptx
@@ -9,11 +9,12 @@
     <p:sldId id="257" r:id="rId3"/>
     <p:sldId id="258" r:id="rId4"/>
     <p:sldId id="259" r:id="rId5"/>
-    <p:sldId id="260" r:id="rId6"/>
-    <p:sldId id="261" r:id="rId7"/>
-    <p:sldId id="262" r:id="rId8"/>
-    <p:sldId id="263" r:id="rId9"/>
-    <p:sldId id="264" r:id="rId10"/>
+    <p:sldId id="265" r:id="rId6"/>
+    <p:sldId id="260" r:id="rId7"/>
+    <p:sldId id="261" r:id="rId8"/>
+    <p:sldId id="262" r:id="rId9"/>
+    <p:sldId id="263" r:id="rId10"/>
+    <p:sldId id="264" r:id="rId11"/>
   </p:sldIdLst>
   <p:sldSz cx="12192000" cy="6858000"/>
   <p:notesSz cx="6858000" cy="9144000"/>
@@ -269,7 +270,7 @@
           <a:p>
             <a:fld id="{E31567E3-1F1E-4B65-8D9F-2680367B1955}" type="datetimeFigureOut">
               <a:rPr lang="en-IN" smtClean="0"/>
-              <a:t>25-04-2025</a:t>
+              <a:t>26-04-2025</a:t>
             </a:fld>
             <a:endParaRPr lang="en-IN"/>
           </a:p>
@@ -469,7 +470,7 @@
           <a:p>
             <a:fld id="{E31567E3-1F1E-4B65-8D9F-2680367B1955}" type="datetimeFigureOut">
               <a:rPr lang="en-IN" smtClean="0"/>
-              <a:t>25-04-2025</a:t>
+              <a:t>26-04-2025</a:t>
             </a:fld>
             <a:endParaRPr lang="en-IN"/>
           </a:p>
@@ -679,7 +680,7 @@
           <a:p>
             <a:fld id="{E31567E3-1F1E-4B65-8D9F-2680367B1955}" type="datetimeFigureOut">
               <a:rPr lang="en-IN" smtClean="0"/>
-              <a:t>25-04-2025</a:t>
+              <a:t>26-04-2025</a:t>
             </a:fld>
             <a:endParaRPr lang="en-IN"/>
           </a:p>
@@ -879,7 +880,7 @@
           <a:p>
             <a:fld id="{E31567E3-1F1E-4B65-8D9F-2680367B1955}" type="datetimeFigureOut">
               <a:rPr lang="en-IN" smtClean="0"/>
-              <a:t>25-04-2025</a:t>
+              <a:t>26-04-2025</a:t>
             </a:fld>
             <a:endParaRPr lang="en-IN"/>
           </a:p>
@@ -1155,7 +1156,7 @@
           <a:p>
             <a:fld id="{E31567E3-1F1E-4B65-8D9F-2680367B1955}" type="datetimeFigureOut">
               <a:rPr lang="en-IN" smtClean="0"/>
-              <a:t>25-04-2025</a:t>
+              <a:t>26-04-2025</a:t>
             </a:fld>
             <a:endParaRPr lang="en-IN"/>
           </a:p>
@@ -1423,7 +1424,7 @@
           <a:p>
             <a:fld id="{E31567E3-1F1E-4B65-8D9F-2680367B1955}" type="datetimeFigureOut">
               <a:rPr lang="en-IN" smtClean="0"/>
-              <a:t>25-04-2025</a:t>
+              <a:t>26-04-2025</a:t>
             </a:fld>
             <a:endParaRPr lang="en-IN"/>
           </a:p>
@@ -1838,7 +1839,7 @@
           <a:p>
             <a:fld id="{E31567E3-1F1E-4B65-8D9F-2680367B1955}" type="datetimeFigureOut">
               <a:rPr lang="en-IN" smtClean="0"/>
-              <a:t>25-04-2025</a:t>
+              <a:t>26-04-2025</a:t>
             </a:fld>
             <a:endParaRPr lang="en-IN"/>
           </a:p>
@@ -1980,7 +1981,7 @@
           <a:p>
             <a:fld id="{E31567E3-1F1E-4B65-8D9F-2680367B1955}" type="datetimeFigureOut">
               <a:rPr lang="en-IN" smtClean="0"/>
-              <a:t>25-04-2025</a:t>
+              <a:t>26-04-2025</a:t>
             </a:fld>
             <a:endParaRPr lang="en-IN"/>
           </a:p>
@@ -2093,7 +2094,7 @@
           <a:p>
             <a:fld id="{E31567E3-1F1E-4B65-8D9F-2680367B1955}" type="datetimeFigureOut">
               <a:rPr lang="en-IN" smtClean="0"/>
-              <a:t>25-04-2025</a:t>
+              <a:t>26-04-2025</a:t>
             </a:fld>
             <a:endParaRPr lang="en-IN"/>
           </a:p>
@@ -2406,7 +2407,7 @@
           <a:p>
             <a:fld id="{E31567E3-1F1E-4B65-8D9F-2680367B1955}" type="datetimeFigureOut">
               <a:rPr lang="en-IN" smtClean="0"/>
-              <a:t>25-04-2025</a:t>
+              <a:t>26-04-2025</a:t>
             </a:fld>
             <a:endParaRPr lang="en-IN"/>
           </a:p>
@@ -2695,7 +2696,7 @@
           <a:p>
             <a:fld id="{E31567E3-1F1E-4B65-8D9F-2680367B1955}" type="datetimeFigureOut">
               <a:rPr lang="en-IN" smtClean="0"/>
-              <a:t>25-04-2025</a:t>
+              <a:t>26-04-2025</a:t>
             </a:fld>
             <a:endParaRPr lang="en-IN"/>
           </a:p>
@@ -2938,7 +2939,7 @@
           <a:p>
             <a:fld id="{E31567E3-1F1E-4B65-8D9F-2680367B1955}" type="datetimeFigureOut">
               <a:rPr lang="en-IN" smtClean="0"/>
-              <a:t>25-04-2025</a:t>
+              <a:t>26-04-2025</a:t>
             </a:fld>
             <a:endParaRPr lang="en-IN"/>
           </a:p>
@@ -3428,6 +3429,440 @@
 </p:sld>
 </file>
 
+<file path=ppt/slides/slide10.xml><?xml version="1.0" encoding="utf-8"?>
+<p:sld xmlns:a="http://schemas.openxmlformats.org/drawingml/2006/main" xmlns:r="http://schemas.openxmlformats.org/officeDocument/2006/relationships" xmlns:p="http://schemas.openxmlformats.org/presentationml/2006/main">
+  <p:cSld>
+    <p:spTree>
+      <p:nvGrpSpPr>
+        <p:cNvPr id="1" name=""/>
+        <p:cNvGrpSpPr/>
+        <p:nvPr/>
+      </p:nvGrpSpPr>
+      <p:grpSpPr>
+        <a:xfrm>
+          <a:off x="0" y="0"/>
+          <a:ext cx="0" cy="0"/>
+          <a:chOff x="0" y="0"/>
+          <a:chExt cx="0" cy="0"/>
+        </a:xfrm>
+      </p:grpSpPr>
+      <p:sp>
+        <p:nvSpPr>
+          <p:cNvPr id="2" name="Title 1">
+            <a:extLst>
+              <a:ext uri="{FF2B5EF4-FFF2-40B4-BE49-F238E27FC236}">
+                <a16:creationId xmlns:a16="http://schemas.microsoft.com/office/drawing/2014/main" id="{3E6E1A3D-D515-5197-3017-1A59273BE890}"/>
+              </a:ext>
+            </a:extLst>
+          </p:cNvPr>
+          <p:cNvSpPr>
+            <a:spLocks noGrp="1"/>
+          </p:cNvSpPr>
+          <p:nvPr>
+            <p:ph type="title"/>
+          </p:nvPr>
+        </p:nvSpPr>
+        <p:spPr>
+          <a:xfrm>
+            <a:off x="838200" y="146752"/>
+            <a:ext cx="10515600" cy="534285"/>
+          </a:xfrm>
+        </p:spPr>
+        <p:txBody>
+          <a:bodyPr>
+            <a:normAutofit fontScale="90000"/>
+          </a:bodyPr>
+          <a:lstStyle/>
+          <a:p>
+            <a:r>
+              <a:rPr lang="en-IN" dirty="0"/>
+              <a:t>References</a:t>
+            </a:r>
+          </a:p>
+        </p:txBody>
+      </p:sp>
+      <p:sp>
+        <p:nvSpPr>
+          <p:cNvPr id="3" name="Content Placeholder 2">
+            <a:extLst>
+              <a:ext uri="{FF2B5EF4-FFF2-40B4-BE49-F238E27FC236}">
+                <a16:creationId xmlns:a16="http://schemas.microsoft.com/office/drawing/2014/main" id="{8922B313-DA68-C9B3-0FA9-B9B7A2B4DAB7}"/>
+              </a:ext>
+            </a:extLst>
+          </p:cNvPr>
+          <p:cNvSpPr>
+            <a:spLocks noGrp="1"/>
+          </p:cNvSpPr>
+          <p:nvPr>
+            <p:ph idx="1"/>
+          </p:nvPr>
+        </p:nvSpPr>
+        <p:spPr>
+          <a:xfrm>
+            <a:off x="838200" y="854439"/>
+            <a:ext cx="10515600" cy="5322524"/>
+          </a:xfrm>
+        </p:spPr>
+        <p:txBody>
+          <a:bodyPr>
+            <a:normAutofit/>
+          </a:bodyPr>
+          <a:lstStyle/>
+          <a:p>
+            <a:pPr marL="0" indent="0">
+              <a:buNone/>
+            </a:pPr>
+            <a:r>
+              <a:rPr lang="en-IN" sz="1800" dirty="0">
+                <a:solidFill>
+                  <a:srgbClr val="333333"/>
+                </a:solidFill>
+                <a:latin typeface="Arial" panose="020B0604020202020204" pitchFamily="34" charset="0"/>
+              </a:rPr>
+              <a:t>[1] </a:t>
+            </a:r>
+            <a:r>
+              <a:rPr lang="en-IN" sz="1800" dirty="0" err="1">
+                <a:solidFill>
+                  <a:srgbClr val="333333"/>
+                </a:solidFill>
+                <a:latin typeface="Arial" panose="020B0604020202020204" pitchFamily="34" charset="0"/>
+              </a:rPr>
+              <a:t>Menglin</a:t>
+            </a:r>
+            <a:r>
+              <a:rPr lang="en-IN" sz="1800" dirty="0">
+                <a:solidFill>
+                  <a:srgbClr val="333333"/>
+                </a:solidFill>
+                <a:latin typeface="Arial" panose="020B0604020202020204" pitchFamily="34" charset="0"/>
+              </a:rPr>
+              <a:t> Jia et al. Visual prompt tuning. ECCV, 2022.</a:t>
+            </a:r>
+            <a:br>
+              <a:rPr lang="en-IN" sz="1800" dirty="0">
+                <a:solidFill>
+                  <a:srgbClr val="333333"/>
+                </a:solidFill>
+                <a:latin typeface="Arial" panose="020B0604020202020204" pitchFamily="34" charset="0"/>
+              </a:rPr>
+            </a:br>
+            <a:r>
+              <a:rPr lang="en-IN" sz="1800" dirty="0">
+                <a:solidFill>
+                  <a:srgbClr val="333333"/>
+                </a:solidFill>
+                <a:latin typeface="Arial" panose="020B0604020202020204" pitchFamily="34" charset="0"/>
+              </a:rPr>
+              <a:t>[2] Edward J Hu et al. </a:t>
+            </a:r>
+            <a:r>
+              <a:rPr lang="en-IN" sz="1800" dirty="0" err="1">
+                <a:solidFill>
+                  <a:srgbClr val="333333"/>
+                </a:solidFill>
+                <a:latin typeface="Arial" panose="020B0604020202020204" pitchFamily="34" charset="0"/>
+              </a:rPr>
+              <a:t>LoRA</a:t>
+            </a:r>
+            <a:r>
+              <a:rPr lang="en-IN" sz="1800" dirty="0">
+                <a:solidFill>
+                  <a:srgbClr val="333333"/>
+                </a:solidFill>
+                <a:latin typeface="Arial" panose="020B0604020202020204" pitchFamily="34" charset="0"/>
+              </a:rPr>
+              <a:t>: Low-rank adaptation of large language models. ICLR, 2022.</a:t>
+            </a:r>
+            <a:br>
+              <a:rPr lang="en-IN" sz="1800" dirty="0">
+                <a:solidFill>
+                  <a:srgbClr val="333333"/>
+                </a:solidFill>
+                <a:latin typeface="Arial" panose="020B0604020202020204" pitchFamily="34" charset="0"/>
+              </a:rPr>
+            </a:br>
+            <a:r>
+              <a:rPr lang="en-IN" sz="1800" dirty="0">
+                <a:solidFill>
+                  <a:srgbClr val="333333"/>
+                </a:solidFill>
+                <a:latin typeface="Arial" panose="020B0604020202020204" pitchFamily="34" charset="0"/>
+              </a:rPr>
+              <a:t>[3] </a:t>
+            </a:r>
+            <a:r>
+              <a:rPr lang="en-IN" sz="1800" dirty="0" err="1">
+                <a:solidFill>
+                  <a:srgbClr val="333333"/>
+                </a:solidFill>
+                <a:latin typeface="Arial" panose="020B0604020202020204" pitchFamily="34" charset="0"/>
+              </a:rPr>
+              <a:t>Jiahang</a:t>
+            </a:r>
+            <a:r>
+              <a:rPr lang="en-IN" sz="1800" dirty="0">
+                <a:solidFill>
+                  <a:srgbClr val="333333"/>
+                </a:solidFill>
+                <a:latin typeface="Arial" panose="020B0604020202020204" pitchFamily="34" charset="0"/>
+              </a:rPr>
+              <a:t> Tu et al. </a:t>
+            </a:r>
+            <a:r>
+              <a:rPr lang="en-IN" sz="1800" dirty="0" err="1">
+                <a:solidFill>
+                  <a:srgbClr val="333333"/>
+                </a:solidFill>
+                <a:latin typeface="Arial" panose="020B0604020202020204" pitchFamily="34" charset="0"/>
+              </a:rPr>
+              <a:t>DriveDitFit</a:t>
+            </a:r>
+            <a:r>
+              <a:rPr lang="en-IN" sz="1800" dirty="0">
+                <a:solidFill>
+                  <a:srgbClr val="333333"/>
+                </a:solidFill>
+                <a:latin typeface="Arial" panose="020B0604020202020204" pitchFamily="34" charset="0"/>
+              </a:rPr>
+              <a:t>: Fine-tuning diffusion transformers for autonomous driving data generation. ACM TOMM, 2025.</a:t>
+            </a:r>
+            <a:br>
+              <a:rPr lang="en-IN" sz="1800" dirty="0">
+                <a:solidFill>
+                  <a:srgbClr val="333333"/>
+                </a:solidFill>
+                <a:latin typeface="Arial" panose="020B0604020202020204" pitchFamily="34" charset="0"/>
+              </a:rPr>
+            </a:br>
+            <a:r>
+              <a:rPr lang="en-IN" sz="1800" dirty="0">
+                <a:solidFill>
+                  <a:srgbClr val="333333"/>
+                </a:solidFill>
+                <a:latin typeface="Arial" panose="020B0604020202020204" pitchFamily="34" charset="0"/>
+              </a:rPr>
+              <a:t>[4] Enze Xie et al. </a:t>
+            </a:r>
+            <a:r>
+              <a:rPr lang="en-IN" sz="1800" dirty="0" err="1">
+                <a:solidFill>
+                  <a:srgbClr val="333333"/>
+                </a:solidFill>
+                <a:latin typeface="Arial" panose="020B0604020202020204" pitchFamily="34" charset="0"/>
+              </a:rPr>
+              <a:t>DiffFit</a:t>
+            </a:r>
+            <a:r>
+              <a:rPr lang="en-IN" sz="1800" dirty="0">
+                <a:solidFill>
+                  <a:srgbClr val="333333"/>
+                </a:solidFill>
+                <a:latin typeface="Arial" panose="020B0604020202020204" pitchFamily="34" charset="0"/>
+              </a:rPr>
+              <a:t>: Unlocking transferability of large diffusion models via simple parameter-efficient fine-tuning. ICCV, 2023.</a:t>
+            </a:r>
+            <a:br>
+              <a:rPr lang="en-IN" sz="1800" dirty="0">
+                <a:solidFill>
+                  <a:srgbClr val="333333"/>
+                </a:solidFill>
+                <a:latin typeface="Arial" panose="020B0604020202020204" pitchFamily="34" charset="0"/>
+              </a:rPr>
+            </a:br>
+            <a:r>
+              <a:rPr lang="en-IN" sz="1800" dirty="0">
+                <a:solidFill>
+                  <a:srgbClr val="333333"/>
+                </a:solidFill>
+                <a:latin typeface="Arial" panose="020B0604020202020204" pitchFamily="34" charset="0"/>
+              </a:rPr>
+              <a:t>[5] Nataniel Ruiz et al. </a:t>
+            </a:r>
+            <a:r>
+              <a:rPr lang="en-IN" sz="1800" dirty="0" err="1">
+                <a:solidFill>
+                  <a:srgbClr val="333333"/>
+                </a:solidFill>
+                <a:latin typeface="Arial" panose="020B0604020202020204" pitchFamily="34" charset="0"/>
+              </a:rPr>
+              <a:t>Dreambooth</a:t>
+            </a:r>
+            <a:r>
+              <a:rPr lang="en-IN" sz="1800" dirty="0">
+                <a:solidFill>
+                  <a:srgbClr val="333333"/>
+                </a:solidFill>
+                <a:latin typeface="Arial" panose="020B0604020202020204" pitchFamily="34" charset="0"/>
+              </a:rPr>
+              <a:t>: Fine-tuning text-to-image diffusion models for subject-driven generation, 2022.</a:t>
+            </a:r>
+            <a:br>
+              <a:rPr lang="en-IN" sz="1800" dirty="0">
+                <a:solidFill>
+                  <a:srgbClr val="333333"/>
+                </a:solidFill>
+                <a:latin typeface="Arial" panose="020B0604020202020204" pitchFamily="34" charset="0"/>
+              </a:rPr>
+            </a:br>
+            <a:r>
+              <a:rPr lang="en-IN" sz="1800" dirty="0">
+                <a:solidFill>
+                  <a:srgbClr val="333333"/>
+                </a:solidFill>
+                <a:latin typeface="Arial" panose="020B0604020202020204" pitchFamily="34" charset="0"/>
+              </a:rPr>
+              <a:t>[6] Rinon Gal et al. An image is worth one word: Personalizing text-to-image generation using textual inversion, 2022.</a:t>
+            </a:r>
+            <a:br>
+              <a:rPr lang="en-IN" sz="1800" dirty="0">
+                <a:solidFill>
+                  <a:srgbClr val="333333"/>
+                </a:solidFill>
+                <a:latin typeface="Arial" panose="020B0604020202020204" pitchFamily="34" charset="0"/>
+              </a:rPr>
+            </a:br>
+            <a:r>
+              <a:rPr lang="en-IN" sz="1800" dirty="0">
+                <a:solidFill>
+                  <a:srgbClr val="333333"/>
+                </a:solidFill>
+                <a:latin typeface="Arial" panose="020B0604020202020204" pitchFamily="34" charset="0"/>
+              </a:rPr>
+              <a:t>[7] </a:t>
+            </a:r>
+            <a:r>
+              <a:rPr lang="en-IN" sz="1800" dirty="0" err="1">
+                <a:solidFill>
+                  <a:srgbClr val="333333"/>
+                </a:solidFill>
+                <a:latin typeface="Arial" panose="020B0604020202020204" pitchFamily="34" charset="0"/>
+              </a:rPr>
+              <a:t>Lvmin</a:t>
+            </a:r>
+            <a:r>
+              <a:rPr lang="en-IN" sz="1800" dirty="0">
+                <a:solidFill>
+                  <a:srgbClr val="333333"/>
+                </a:solidFill>
+                <a:latin typeface="Arial" panose="020B0604020202020204" pitchFamily="34" charset="0"/>
+              </a:rPr>
+              <a:t> Zhang et al. Adding conditional control to text-to-image diffusion models.</a:t>
+            </a:r>
+          </a:p>
+          <a:p>
+            <a:pPr marL="0" indent="0">
+              <a:buNone/>
+            </a:pPr>
+            <a:r>
+              <a:rPr lang="en-IN" sz="1800" dirty="0">
+                <a:solidFill>
+                  <a:srgbClr val="333333"/>
+                </a:solidFill>
+                <a:latin typeface="Arial" panose="020B0604020202020204" pitchFamily="34" charset="0"/>
+              </a:rPr>
+              <a:t>[8] Elad Ben Zaken et al. </a:t>
+            </a:r>
+            <a:r>
+              <a:rPr lang="en-IN" sz="1800" dirty="0" err="1">
+                <a:solidFill>
+                  <a:srgbClr val="333333"/>
+                </a:solidFill>
+                <a:latin typeface="Arial" panose="020B0604020202020204" pitchFamily="34" charset="0"/>
+              </a:rPr>
+              <a:t>BitFit</a:t>
+            </a:r>
+            <a:r>
+              <a:rPr lang="en-IN" sz="1800" dirty="0">
+                <a:solidFill>
+                  <a:srgbClr val="333333"/>
+                </a:solidFill>
+                <a:latin typeface="Arial" panose="020B0604020202020204" pitchFamily="34" charset="0"/>
+              </a:rPr>
+              <a:t>: Simple parameter-efficient fine-tuning for transformer-based masked language models. ACL 2022.</a:t>
+            </a:r>
+          </a:p>
+          <a:p>
+            <a:pPr marL="0" indent="0">
+              <a:buNone/>
+            </a:pPr>
+            <a:r>
+              <a:rPr lang="en-IN" sz="1800" dirty="0">
+                <a:solidFill>
+                  <a:srgbClr val="333333"/>
+                </a:solidFill>
+                <a:latin typeface="Arial" panose="020B0604020202020204" pitchFamily="34" charset="0"/>
+              </a:rPr>
+              <a:t>[9] </a:t>
+            </a:r>
+            <a:r>
+              <a:rPr lang="en-IN" sz="1800" b="0" i="0" dirty="0">
+                <a:solidFill>
+                  <a:srgbClr val="333333"/>
+                </a:solidFill>
+                <a:effectLst/>
+                <a:latin typeface="Arial" panose="020B0604020202020204" pitchFamily="34" charset="0"/>
+              </a:rPr>
+              <a:t>R. Zhang, P. Isola, A. A. Efros, E. Shechtman and O. Wang, "The Unreasonable Effectiveness of Deep Features as a Perceptual Metric," in 2018 IEEE/CVF Conference on Computer Vision and Pattern Recognition (CVPR</a:t>
+            </a:r>
+          </a:p>
+          <a:p>
+            <a:pPr marL="0" indent="0">
+              <a:buNone/>
+            </a:pPr>
+            <a:r>
+              <a:rPr lang="en-IN" sz="1800" dirty="0">
+                <a:solidFill>
+                  <a:srgbClr val="333333"/>
+                </a:solidFill>
+                <a:latin typeface="Arial" panose="020B0604020202020204" pitchFamily="34" charset="0"/>
+              </a:rPr>
+              <a:t>[10]</a:t>
+            </a:r>
+            <a:r>
+              <a:rPr lang="en-US" sz="1800" dirty="0">
+                <a:solidFill>
+                  <a:srgbClr val="333333"/>
+                </a:solidFill>
+                <a:latin typeface="Arial" panose="020B0604020202020204" pitchFamily="34" charset="0"/>
+              </a:rPr>
+              <a:t>Wang, Z. &amp; Simoncelli, Eero &amp; </a:t>
+            </a:r>
+            <a:r>
+              <a:rPr lang="en-US" sz="1800" dirty="0" err="1">
+                <a:solidFill>
+                  <a:srgbClr val="333333"/>
+                </a:solidFill>
+                <a:latin typeface="Arial" panose="020B0604020202020204" pitchFamily="34" charset="0"/>
+              </a:rPr>
+              <a:t>Bovik</a:t>
+            </a:r>
+            <a:r>
+              <a:rPr lang="en-US" sz="1800" dirty="0">
+                <a:solidFill>
+                  <a:srgbClr val="333333"/>
+                </a:solidFill>
+                <a:latin typeface="Arial" panose="020B0604020202020204" pitchFamily="34" charset="0"/>
+              </a:rPr>
+              <a:t>, Alan. (2003). Multiscale structural similarity for image quality assessment. Conference Record of the Asilomar Conference on Signals, Systems and Computers. 2. 1398 - 1402 Vol.2. 10.1109/ACSSC.2003.1292216. </a:t>
+            </a:r>
+            <a:endParaRPr lang="en-IN" sz="1800" dirty="0"/>
+          </a:p>
+        </p:txBody>
+      </p:sp>
+    </p:spTree>
+    <p:extLst>
+      <p:ext uri="{BB962C8B-B14F-4D97-AF65-F5344CB8AC3E}">
+        <p14:creationId xmlns:p14="http://schemas.microsoft.com/office/powerpoint/2010/main" val="3695217793"/>
+      </p:ext>
+    </p:extLst>
+  </p:cSld>
+  <p:clrMapOvr>
+    <a:masterClrMapping/>
+  </p:clrMapOvr>
+</p:sld>
+</file>
+
 <file path=ppt/slides/slide2.xml><?xml version="1.0" encoding="utf-8"?>
 <p:sld xmlns:a="http://schemas.openxmlformats.org/drawingml/2006/main" xmlns:r="http://schemas.openxmlformats.org/officeDocument/2006/relationships" xmlns:p="http://schemas.openxmlformats.org/presentationml/2006/main">
   <p:cSld>
@@ -3625,7 +4060,9 @@
           </a:xfrm>
         </p:spPr>
         <p:txBody>
-          <a:bodyPr/>
+          <a:bodyPr>
+            <a:normAutofit lnSpcReduction="10000"/>
+          </a:bodyPr>
           <a:lstStyle/>
           <a:p>
             <a:r>
@@ -3638,14 +4075,29 @@
             </a:r>
             <a:r>
               <a:rPr lang="en-IN" dirty="0"/>
-              <a:t>-XL/2[]</a:t>
+              <a:t>-XL/2</a:t>
             </a:r>
           </a:p>
           <a:p>
             <a:pPr lvl="1"/>
             <a:r>
               <a:rPr lang="en-IN" dirty="0"/>
-              <a:t>Diffusion Transformer, class-conditional, trained on ImageNet</a:t>
+              <a:t>Diffusion Transformer, class-conditional, trained on ImageNet.</a:t>
+            </a:r>
+          </a:p>
+          <a:p>
+            <a:pPr lvl="1"/>
+            <a:r>
+              <a:rPr lang="en-IN" dirty="0"/>
+              <a:t>Most </a:t>
+            </a:r>
+            <a:r>
+              <a:rPr lang="en-IN" dirty="0" err="1"/>
+              <a:t>DefectSpectrum</a:t>
+            </a:r>
+            <a:r>
+              <a:rPr lang="en-IN" dirty="0"/>
+              <a:t> images are texture-like, transformer is known to work well on such images because of its larger receptive field.</a:t>
             </a:r>
           </a:p>
           <a:p>
@@ -3688,6 +4140,13 @@
             <a:r>
               <a:rPr lang="en-IN" dirty="0"/>
               <a:t> weights (parameter-efficient)</a:t>
+            </a:r>
+          </a:p>
+          <a:p>
+            <a:pPr lvl="1"/>
+            <a:r>
+              <a:rPr lang="en-IN" dirty="0"/>
+              <a:t>Full fine-tuning runs the risk of catastrophic forgetting, is GPU memory intensive</a:t>
             </a:r>
           </a:p>
           <a:p>
@@ -3983,40 +4442,6 @@
 <file path=ppt/slides/slide5.xml><?xml version="1.0" encoding="utf-8"?>
 <p:sld xmlns:a="http://schemas.openxmlformats.org/drawingml/2006/main" xmlns:r="http://schemas.openxmlformats.org/officeDocument/2006/relationships" xmlns:p="http://schemas.openxmlformats.org/presentationml/2006/main">
   <p:cSld>
-    <p:bg>
-      <p:bgPr>
-        <a:gradFill>
-          <a:gsLst>
-            <a:gs pos="0">
-              <a:schemeClr val="accent1">
-                <a:lumMod val="5000"/>
-                <a:lumOff val="95000"/>
-              </a:schemeClr>
-            </a:gs>
-            <a:gs pos="74000">
-              <a:schemeClr val="accent1">
-                <a:lumMod val="45000"/>
-                <a:lumOff val="55000"/>
-              </a:schemeClr>
-            </a:gs>
-            <a:gs pos="83000">
-              <a:schemeClr val="accent1">
-                <a:lumMod val="45000"/>
-                <a:lumOff val="55000"/>
-              </a:schemeClr>
-            </a:gs>
-            <a:gs pos="100000">
-              <a:schemeClr val="accent1">
-                <a:lumMod val="30000"/>
-                <a:lumOff val="70000"/>
-              </a:schemeClr>
-            </a:gs>
-          </a:gsLst>
-          <a:lin ang="5400000" scaled="1"/>
-        </a:gradFill>
-        <a:effectLst/>
-      </p:bgPr>
-    </p:bg>
     <p:spTree>
       <p:nvGrpSpPr>
         <p:cNvPr id="1" name=""/>
@@ -4036,7 +4461,7 @@
           <p:cNvPr id="2" name="Title 1">
             <a:extLst>
               <a:ext uri="{FF2B5EF4-FFF2-40B4-BE49-F238E27FC236}">
-                <a16:creationId xmlns:a16="http://schemas.microsoft.com/office/drawing/2014/main" id="{F8B4C18D-9BEF-D8A2-CF15-C07F2921999F}"/>
+                <a16:creationId xmlns:a16="http://schemas.microsoft.com/office/drawing/2014/main" id="{BA33CDA3-34C5-B155-BD73-FE5C3A11CBFF}"/>
               </a:ext>
             </a:extLst>
           </p:cNvPr>
@@ -4049,17 +4474,19 @@
         </p:nvSpPr>
         <p:spPr>
           <a:xfrm>
-            <a:off x="838200" y="18256"/>
-            <a:ext cx="10515600" cy="717866"/>
+            <a:off x="838200" y="170254"/>
+            <a:ext cx="10515600" cy="624226"/>
           </a:xfrm>
         </p:spPr>
         <p:txBody>
-          <a:bodyPr/>
-          <a:lstStyle/>
-          <a:p>
-            <a:r>
-              <a:rPr lang="en-IN" dirty="0"/>
-              <a:t>Evaluation Metrics</a:t>
+          <a:bodyPr>
+            <a:normAutofit fontScale="90000"/>
+          </a:bodyPr>
+          <a:lstStyle/>
+          <a:p>
+            <a:r>
+              <a:rPr lang="en-IN" dirty="0"/>
+              <a:t>Hyperparameters</a:t>
             </a:r>
           </a:p>
         </p:txBody>
@@ -4069,7 +4496,7 @@
           <p:cNvPr id="3" name="Content Placeholder 2">
             <a:extLst>
               <a:ext uri="{FF2B5EF4-FFF2-40B4-BE49-F238E27FC236}">
-                <a16:creationId xmlns:a16="http://schemas.microsoft.com/office/drawing/2014/main" id="{A6D27945-23F8-C6FE-B87E-3B1293B58521}"/>
+                <a16:creationId xmlns:a16="http://schemas.microsoft.com/office/drawing/2014/main" id="{DD7E4F05-4DBA-B6E8-936C-D10512699895}"/>
               </a:ext>
             </a:extLst>
           </p:cNvPr>
@@ -4082,116 +4509,77 @@
         </p:nvSpPr>
         <p:spPr>
           <a:xfrm>
-            <a:off x="838200" y="868392"/>
-            <a:ext cx="10515600" cy="5832211"/>
+            <a:off x="838200" y="794480"/>
+            <a:ext cx="10515600" cy="5382483"/>
           </a:xfrm>
         </p:spPr>
         <p:txBody>
-          <a:bodyPr>
-            <a:normAutofit/>
-          </a:bodyPr>
-          <a:lstStyle/>
-          <a:p>
-            <a:r>
-              <a:rPr lang="en-IN" dirty="0"/>
-              <a:t>To evaluate the quality of generated images</a:t>
+          <a:bodyPr/>
+          <a:lstStyle/>
+          <a:p>
+            <a:r>
+              <a:rPr lang="en-IN" dirty="0"/>
+              <a:t>Batch size – Experimented with 1, 2, 4 and 8</a:t>
             </a:r>
           </a:p>
           <a:p>
             <a:pPr lvl="1"/>
             <a:r>
-              <a:rPr lang="en-US" dirty="0" err="1"/>
-              <a:t>Fretchet</a:t>
-            </a:r>
-            <a:r>
-              <a:rPr lang="en-US" dirty="0"/>
-              <a:t> Inception Distance – captures quality and diversity of samples; measures the </a:t>
-            </a:r>
-            <a:r>
-              <a:rPr lang="en-US" dirty="0" err="1"/>
-              <a:t>Frechet’s</a:t>
-            </a:r>
-            <a:r>
-              <a:rPr lang="en-US" dirty="0"/>
-              <a:t> distance between real and generated distributions</a:t>
-            </a:r>
-          </a:p>
-          <a:p>
-            <a:pPr lvl="2"/>
-            <a:r>
-              <a:rPr lang="en-IN" dirty="0"/>
-              <a:t>FID to be computed at class level - the difference between class-conditional distributions</a:t>
+              <a:rPr lang="en-IN" dirty="0"/>
+              <a:t>Typically small batch size worked better, and I used 2 in most experiments</a:t>
             </a:r>
           </a:p>
           <a:p>
             <a:pPr lvl="1"/>
             <a:r>
               <a:rPr lang="en-IN" dirty="0"/>
-              <a:t>Variations such as KID (which capture higher-order statistics) </a:t>
+              <a:t>Learning rate scaled according to batch size</a:t>
+            </a:r>
+          </a:p>
+          <a:p>
+            <a:r>
+              <a:rPr lang="en-IN" dirty="0"/>
+              <a:t>Learning rate – Tried 1e-6, 1e-5, 2e-5, 5e-5 (depending upon batch size)</a:t>
             </a:r>
           </a:p>
           <a:p>
             <a:pPr lvl="1"/>
             <a:r>
               <a:rPr lang="en-IN" dirty="0"/>
-              <a:t>Perceptual quality metrics such as MS-SSIM[10] and LPIPS[9] (class-level)</a:t>
-            </a:r>
-          </a:p>
-          <a:p>
-            <a:r>
-              <a:rPr lang="en-IN" dirty="0"/>
-              <a:t>To evaluate the utility of generated images</a:t>
+              <a:t>LR 1e-5 with batch size 2 worked better than others</a:t>
+            </a:r>
+          </a:p>
+          <a:p>
+            <a:r>
+              <a:rPr lang="en-IN" dirty="0"/>
+              <a:t>Gradient accumulation – To account for small batch sizes, used gradient accumulation for 2 steps before updating weights</a:t>
+            </a:r>
+          </a:p>
+          <a:p>
+            <a:r>
+              <a:rPr lang="en-IN" dirty="0"/>
+              <a:t>Noise scheduler steps </a:t>
             </a:r>
           </a:p>
           <a:p>
             <a:pPr lvl="1"/>
             <a:r>
               <a:rPr lang="en-IN" dirty="0"/>
-              <a:t>Add generated images to the real data. Train classifiers on both, real and augmented data</a:t>
-            </a:r>
-          </a:p>
-          <a:p>
-            <a:pPr lvl="2"/>
-            <a:r>
-              <a:rPr lang="en-IN" dirty="0"/>
-              <a:t>Hypothesis – Metrics should significantly improve with the augmented data.</a:t>
-            </a:r>
-            <a:br>
-              <a:rPr lang="en-IN" dirty="0"/>
-            </a:br>
-            <a:r>
-              <a:rPr lang="en-IN" dirty="0"/>
-              <a:t>Metrics – Precision, recall, F1, and others</a:t>
-            </a:r>
-          </a:p>
-          <a:p>
-            <a:pPr lvl="2"/>
-            <a:r>
-              <a:rPr lang="en-IN" dirty="0"/>
-              <a:t>If additional annotations (e.g. segmentation mask) are available, they can be used to get more detailed metrics such as </a:t>
-            </a:r>
-            <a:r>
-              <a:rPr lang="en-IN" dirty="0" err="1"/>
-              <a:t>mAP@k</a:t>
-            </a:r>
-            <a:endParaRPr lang="en-IN" dirty="0"/>
-          </a:p>
-          <a:p>
-            <a:pPr lvl="1"/>
-            <a:r>
-              <a:rPr lang="en-IN" dirty="0"/>
-              <a:t>Alternatively, get embeddings of generated images -&gt; KNN classification (no training) in embedding space – Evaluates the class-alignment in generated images</a:t>
-            </a:r>
-          </a:p>
-          <a:p>
-            <a:endParaRPr lang="en-IN" dirty="0"/>
+              <a:t>Tried 20, 40, 100, 200,500 and 1000. Generally, 100-200 worked better</a:t>
+            </a:r>
+          </a:p>
+          <a:p>
+            <a:r>
+              <a:rPr lang="en-IN" dirty="0"/>
+              <a:t>Mixed precision training – to enhance GPU memory efficiency</a:t>
+            </a:r>
           </a:p>
         </p:txBody>
       </p:sp>
     </p:spTree>
     <p:extLst>
       <p:ext uri="{BB962C8B-B14F-4D97-AF65-F5344CB8AC3E}">
-        <p14:creationId xmlns:p14="http://schemas.microsoft.com/office/powerpoint/2010/main" val="3011895043"/>
+        <p14:creationId xmlns:p14="http://schemas.microsoft.com/office/powerpoint/2010/main" val="872941392"/>
       </p:ext>
     </p:extLst>
   </p:cSld>
@@ -4202,220 +4590,6 @@
 </file>
 
 <file path=ppt/slides/slide6.xml><?xml version="1.0" encoding="utf-8"?>
-<p:sld xmlns:a="http://schemas.openxmlformats.org/drawingml/2006/main" xmlns:r="http://schemas.openxmlformats.org/officeDocument/2006/relationships" xmlns:p="http://schemas.openxmlformats.org/presentationml/2006/main">
-  <p:cSld>
-    <p:spTree>
-      <p:nvGrpSpPr>
-        <p:cNvPr id="1" name=""/>
-        <p:cNvGrpSpPr/>
-        <p:nvPr/>
-      </p:nvGrpSpPr>
-      <p:grpSpPr>
-        <a:xfrm>
-          <a:off x="0" y="0"/>
-          <a:ext cx="0" cy="0"/>
-          <a:chOff x="0" y="0"/>
-          <a:chExt cx="0" cy="0"/>
-        </a:xfrm>
-      </p:grpSpPr>
-      <p:sp>
-        <p:nvSpPr>
-          <p:cNvPr id="2" name="Title 1">
-            <a:extLst>
-              <a:ext uri="{FF2B5EF4-FFF2-40B4-BE49-F238E27FC236}">
-                <a16:creationId xmlns:a16="http://schemas.microsoft.com/office/drawing/2014/main" id="{7B43F7C5-DEFA-B5D7-F0A6-BA90C50B4EFD}"/>
-              </a:ext>
-            </a:extLst>
-          </p:cNvPr>
-          <p:cNvSpPr>
-            <a:spLocks noGrp="1"/>
-          </p:cNvSpPr>
-          <p:nvPr>
-            <p:ph type="title"/>
-          </p:nvPr>
-        </p:nvSpPr>
-        <p:spPr>
-          <a:xfrm>
-            <a:off x="838200" y="365126"/>
-            <a:ext cx="10515600" cy="704550"/>
-          </a:xfrm>
-        </p:spPr>
-        <p:txBody>
-          <a:bodyPr/>
-          <a:lstStyle/>
-          <a:p>
-            <a:r>
-              <a:rPr lang="en-IN" dirty="0"/>
-              <a:t>Further Enhancements</a:t>
-            </a:r>
-          </a:p>
-        </p:txBody>
-      </p:sp>
-      <p:sp>
-        <p:nvSpPr>
-          <p:cNvPr id="3" name="Content Placeholder 2">
-            <a:extLst>
-              <a:ext uri="{FF2B5EF4-FFF2-40B4-BE49-F238E27FC236}">
-                <a16:creationId xmlns:a16="http://schemas.microsoft.com/office/drawing/2014/main" id="{66FDDCB3-34F8-9029-7812-A603963B7750}"/>
-              </a:ext>
-            </a:extLst>
-          </p:cNvPr>
-          <p:cNvSpPr>
-            <a:spLocks noGrp="1"/>
-          </p:cNvSpPr>
-          <p:nvPr>
-            <p:ph idx="1"/>
-          </p:nvPr>
-        </p:nvSpPr>
-        <p:spPr>
-          <a:xfrm>
-            <a:off x="838200" y="1069676"/>
-            <a:ext cx="10515600" cy="5107287"/>
-          </a:xfrm>
-        </p:spPr>
-        <p:txBody>
-          <a:bodyPr>
-            <a:normAutofit lnSpcReduction="10000"/>
-          </a:bodyPr>
-          <a:lstStyle/>
-          <a:p>
-            <a:r>
-              <a:rPr lang="en-IN" dirty="0"/>
-              <a:t>Other parameter-efficient fine-tuning methods</a:t>
-            </a:r>
-          </a:p>
-          <a:p>
-            <a:pPr lvl="1"/>
-            <a:r>
-              <a:rPr lang="en-IN" dirty="0" err="1"/>
-              <a:t>LoRA</a:t>
-            </a:r>
-            <a:r>
-              <a:rPr lang="en-IN" dirty="0"/>
-              <a:t> methods. For e.g., </a:t>
-            </a:r>
-            <a:r>
-              <a:rPr lang="en-IN" dirty="0" err="1"/>
-              <a:t>DriveDitFit</a:t>
-            </a:r>
-            <a:r>
-              <a:rPr lang="en-IN" dirty="0"/>
-              <a:t>[3] suggested a </a:t>
-            </a:r>
-            <a:r>
-              <a:rPr lang="en-IN" dirty="0" err="1"/>
-              <a:t>LoRA</a:t>
-            </a:r>
-            <a:r>
-              <a:rPr lang="en-IN" dirty="0"/>
-              <a:t> method for tuning attention weights in </a:t>
-            </a:r>
-            <a:r>
-              <a:rPr lang="en-IN" dirty="0" err="1"/>
-              <a:t>DiT</a:t>
-            </a:r>
-            <a:endParaRPr lang="en-IN" dirty="0"/>
-          </a:p>
-          <a:p>
-            <a:pPr lvl="1"/>
-            <a:r>
-              <a:rPr lang="en-IN" dirty="0" err="1"/>
-              <a:t>DriveDitFit</a:t>
-            </a:r>
-            <a:r>
-              <a:rPr lang="en-IN" dirty="0"/>
-              <a:t> also suggested to initialize class embeddings with the nearest class embeddings from ImageNet, based on CLIP similarity (rather than the superficial label level similarity as we used)</a:t>
-            </a:r>
-          </a:p>
-          <a:p>
-            <a:r>
-              <a:rPr lang="en-IN" dirty="0" err="1"/>
-              <a:t>Dreambooth</a:t>
-            </a:r>
-            <a:r>
-              <a:rPr lang="en-IN" dirty="0"/>
-              <a:t> &amp; Textual Inversion [5,6]</a:t>
-            </a:r>
-          </a:p>
-          <a:p>
-            <a:pPr lvl="1"/>
-            <a:r>
-              <a:rPr lang="en-IN" dirty="0"/>
-              <a:t>Embed new concepts in the models space by introducing rare tokens. </a:t>
-            </a:r>
-            <a:br>
-              <a:rPr lang="en-IN" dirty="0"/>
-            </a:br>
-            <a:r>
-              <a:rPr lang="en-IN" dirty="0"/>
-              <a:t>e.g., </a:t>
-            </a:r>
-            <a:r>
-              <a:rPr lang="en-IN" dirty="0" err="1"/>
-              <a:t>sks_scratch</a:t>
-            </a:r>
-            <a:r>
-              <a:rPr lang="en-IN" dirty="0"/>
-              <a:t> for a scratch defect</a:t>
-            </a:r>
-          </a:p>
-          <a:p>
-            <a:r>
-              <a:rPr lang="en-IN" dirty="0"/>
-              <a:t>Leveraging additional information/annotations</a:t>
-            </a:r>
-          </a:p>
-          <a:p>
-            <a:pPr lvl="1"/>
-            <a:r>
-              <a:rPr lang="en-IN" dirty="0"/>
-              <a:t>ControlNet: Conditional generation with segmentation masks </a:t>
-            </a:r>
-          </a:p>
-          <a:p>
-            <a:r>
-              <a:rPr lang="en-IN" dirty="0"/>
-              <a:t>Classifier-free guidance tuning (not exposed in </a:t>
-            </a:r>
-            <a:r>
-              <a:rPr lang="en-IN" dirty="0" err="1"/>
-              <a:t>HuggingFace</a:t>
-            </a:r>
-            <a:r>
-              <a:rPr lang="en-IN" dirty="0"/>
-              <a:t> </a:t>
-            </a:r>
-            <a:r>
-              <a:rPr lang="en-IN" dirty="0" err="1"/>
-              <a:t>DiT</a:t>
-            </a:r>
-            <a:r>
-              <a:rPr lang="en-IN" dirty="0"/>
-              <a:t>)</a:t>
-            </a:r>
-          </a:p>
-          <a:p>
-            <a:r>
-              <a:rPr lang="en-IN" dirty="0"/>
-              <a:t>Knowledge distillation into smaller models</a:t>
-            </a:r>
-          </a:p>
-        </p:txBody>
-      </p:sp>
-    </p:spTree>
-    <p:extLst>
-      <p:ext uri="{BB962C8B-B14F-4D97-AF65-F5344CB8AC3E}">
-        <p14:creationId xmlns:p14="http://schemas.microsoft.com/office/powerpoint/2010/main" val="895154746"/>
-      </p:ext>
-    </p:extLst>
-  </p:cSld>
-  <p:clrMapOvr>
-    <a:masterClrMapping/>
-  </p:clrMapOvr>
-</p:sld>
-</file>
-
-<file path=ppt/slides/slide7.xml><?xml version="1.0" encoding="utf-8"?>
 <p:sld xmlns:a="http://schemas.openxmlformats.org/drawingml/2006/main" xmlns:r="http://schemas.openxmlformats.org/officeDocument/2006/relationships" xmlns:p="http://schemas.openxmlformats.org/presentationml/2006/main">
   <p:cSld>
     <p:bg>
@@ -4471,7 +4645,7 @@
           <p:cNvPr id="2" name="Title 1">
             <a:extLst>
               <a:ext uri="{FF2B5EF4-FFF2-40B4-BE49-F238E27FC236}">
-                <a16:creationId xmlns:a16="http://schemas.microsoft.com/office/drawing/2014/main" id="{36E658C3-3986-6496-E4E7-01E41DC0CAD9}"/>
+                <a16:creationId xmlns:a16="http://schemas.microsoft.com/office/drawing/2014/main" id="{F8B4C18D-9BEF-D8A2-CF15-C07F2921999F}"/>
               </a:ext>
             </a:extLst>
           </p:cNvPr>
@@ -4484,19 +4658,17 @@
         </p:nvSpPr>
         <p:spPr>
           <a:xfrm>
-            <a:off x="838200" y="86792"/>
-            <a:ext cx="10515600" cy="594245"/>
+            <a:off x="838200" y="18256"/>
+            <a:ext cx="10515600" cy="717866"/>
           </a:xfrm>
         </p:spPr>
         <p:txBody>
-          <a:bodyPr>
-            <a:normAutofit fontScale="90000"/>
-          </a:bodyPr>
-          <a:lstStyle/>
-          <a:p>
-            <a:r>
-              <a:rPr lang="en-IN" dirty="0"/>
-              <a:t>How to leverage segmentation masks?</a:t>
+          <a:bodyPr/>
+          <a:lstStyle/>
+          <a:p>
+            <a:r>
+              <a:rPr lang="en-IN" dirty="0"/>
+              <a:t>Evaluation Metrics</a:t>
             </a:r>
           </a:p>
         </p:txBody>
@@ -4506,7 +4678,7 @@
           <p:cNvPr id="3" name="Content Placeholder 2">
             <a:extLst>
               <a:ext uri="{FF2B5EF4-FFF2-40B4-BE49-F238E27FC236}">
-                <a16:creationId xmlns:a16="http://schemas.microsoft.com/office/drawing/2014/main" id="{060FCC2C-2BA4-3C01-2782-D987DDBA4086}"/>
+                <a16:creationId xmlns:a16="http://schemas.microsoft.com/office/drawing/2014/main" id="{A6D27945-23F8-C6FE-B87E-3B1293B58521}"/>
               </a:ext>
             </a:extLst>
           </p:cNvPr>
@@ -4519,90 +4691,116 @@
         </p:nvSpPr>
         <p:spPr>
           <a:xfrm>
-            <a:off x="838200" y="869430"/>
-            <a:ext cx="10515600" cy="5307533"/>
+            <a:off x="838200" y="868392"/>
+            <a:ext cx="10515600" cy="5832211"/>
           </a:xfrm>
         </p:spPr>
         <p:txBody>
-          <a:bodyPr/>
-          <a:lstStyle/>
-          <a:p>
-            <a:r>
-              <a:rPr lang="en-IN" dirty="0"/>
-              <a:t>Pass the segmentation </a:t>
+          <a:bodyPr>
+            <a:normAutofit/>
+          </a:bodyPr>
+          <a:lstStyle/>
+          <a:p>
+            <a:r>
+              <a:rPr lang="en-IN" dirty="0"/>
+              <a:t>To evaluate the quality of generated images</a:t>
+            </a:r>
+          </a:p>
+          <a:p>
+            <a:pPr lvl="1"/>
+            <a:r>
+              <a:rPr lang="en-US" dirty="0" err="1"/>
+              <a:t>Fretchet</a:t>
+            </a:r>
+            <a:r>
+              <a:rPr lang="en-US" dirty="0"/>
+              <a:t> Inception Distance – captures quality and diversity of samples; measures the </a:t>
+            </a:r>
+            <a:r>
+              <a:rPr lang="en-US" dirty="0" err="1"/>
+              <a:t>Frechet’s</a:t>
+            </a:r>
+            <a:r>
+              <a:rPr lang="en-US" dirty="0"/>
+              <a:t> distance between real and generated distributions</a:t>
+            </a:r>
+          </a:p>
+          <a:p>
+            <a:pPr lvl="2"/>
+            <a:r>
+              <a:rPr lang="en-IN" dirty="0"/>
+              <a:t>FID to be computed at class level - the difference between class-conditional distributions</a:t>
+            </a:r>
+          </a:p>
+          <a:p>
+            <a:pPr lvl="1"/>
+            <a:r>
+              <a:rPr lang="en-IN" dirty="0"/>
+              <a:t>Variations such as KID (which capture higher-order statistics) </a:t>
+            </a:r>
+          </a:p>
+          <a:p>
+            <a:pPr lvl="1"/>
+            <a:r>
+              <a:rPr lang="en-IN" dirty="0"/>
+              <a:t>Perceptual quality metrics such as MS-SSIM[10] and LPIPS[9] (class-level)</a:t>
+            </a:r>
+          </a:p>
+          <a:p>
+            <a:r>
+              <a:rPr lang="en-IN" dirty="0"/>
+              <a:t>To evaluate the utility of generated images</a:t>
+            </a:r>
+          </a:p>
+          <a:p>
+            <a:pPr lvl="1"/>
+            <a:r>
+              <a:rPr lang="en-IN" dirty="0"/>
+              <a:t>Add generated images to the real data. Train classifiers on both, real and augmented data</a:t>
+            </a:r>
+          </a:p>
+          <a:p>
+            <a:pPr lvl="2"/>
+            <a:r>
+              <a:rPr lang="en-IN" dirty="0"/>
+              <a:t>Hypothesis – Metrics should significantly improve with the augmented data.</a:t>
+            </a:r>
+            <a:br>
+              <a:rPr lang="en-IN" dirty="0"/>
+            </a:br>
+            <a:r>
+              <a:rPr lang="en-IN" dirty="0"/>
+              <a:t>Metrics – Precision, recall, F1, and others</a:t>
+            </a:r>
+          </a:p>
+          <a:p>
+            <a:pPr lvl="2"/>
+            <a:r>
+              <a:rPr lang="en-IN" dirty="0"/>
+              <a:t>If additional annotations (e.g. segmentation mask) are available, they can be used to get more detailed metrics such as </a:t>
             </a:r>
             <a:r>
               <a:rPr lang="en-IN" dirty="0" err="1"/>
-              <a:t>maks</a:t>
-            </a:r>
-            <a:r>
-              <a:rPr lang="en-IN" dirty="0"/>
-              <a:t> as extra conditioning information to a suitable architecture such as ControlNet</a:t>
-            </a:r>
+              <a:t>mAP@k</a:t>
+            </a:r>
+            <a:endParaRPr lang="en-IN" dirty="0"/>
           </a:p>
           <a:p>
             <a:pPr lvl="1"/>
             <a:r>
               <a:rPr lang="en-IN" dirty="0"/>
-              <a:t>Pass the conditioning image through a parallel convolution network, and inject the features into the main network with residual connections</a:t>
-            </a:r>
-          </a:p>
-          <a:p>
-            <a:r>
-              <a:rPr lang="en-IN" dirty="0"/>
-              <a:t>Add class-conditioning mechanism to ControlNet</a:t>
-            </a:r>
-          </a:p>
-          <a:p>
-            <a:pPr lvl="1"/>
-            <a:r>
-              <a:rPr lang="en-IN" dirty="0"/>
-              <a:t>Can pass the class-embedding to </a:t>
-            </a:r>
-            <a:r>
-              <a:rPr lang="en-IN" dirty="0" err="1"/>
-              <a:t>Unet</a:t>
-            </a:r>
-            <a:r>
-              <a:rPr lang="en-IN" dirty="0"/>
-              <a:t> blocks (e.g. add to the timestep embedding)</a:t>
-            </a:r>
-          </a:p>
-          <a:p>
-            <a:pPr lvl="1"/>
-            <a:r>
-              <a:rPr lang="en-IN" dirty="0"/>
-              <a:t>Alternatively, can append the class embedding as an extra channel in the segmentation mask (with suitable </a:t>
-            </a:r>
-            <a:r>
-              <a:rPr lang="en-IN" dirty="0" err="1"/>
-              <a:t>projection+reshaping</a:t>
-            </a:r>
-            <a:r>
-              <a:rPr lang="en-IN" dirty="0"/>
-              <a:t>)</a:t>
-            </a:r>
-          </a:p>
-          <a:p>
-            <a:pPr lvl="1"/>
-            <a:r>
-              <a:rPr lang="en-IN" dirty="0"/>
-              <a:t>Represent the class label as a text prompt (e.g., “a screw with crack”) and use text-conditional ControlNet – combine guidance from both</a:t>
-            </a:r>
-          </a:p>
-          <a:p>
-            <a:pPr lvl="1"/>
-            <a:r>
-              <a:rPr lang="en-IN" dirty="0"/>
-              <a:t>Classifier-free guidance could be used to guide the sampling process (also need conditioning drop-out during training)</a:t>
-            </a:r>
+              <a:t>Alternatively, get embeddings of generated images -&gt; KNN classification (no training) in embedding space – Evaluates the class-alignment in generated images</a:t>
+            </a:r>
+          </a:p>
+          <a:p>
+            <a:endParaRPr lang="en-IN" dirty="0"/>
           </a:p>
         </p:txBody>
       </p:sp>
     </p:spTree>
     <p:extLst>
       <p:ext uri="{BB962C8B-B14F-4D97-AF65-F5344CB8AC3E}">
-        <p14:creationId xmlns:p14="http://schemas.microsoft.com/office/powerpoint/2010/main" val="551709318"/>
+        <p14:creationId xmlns:p14="http://schemas.microsoft.com/office/powerpoint/2010/main" val="3011895043"/>
       </p:ext>
     </p:extLst>
   </p:cSld>
@@ -4612,7 +4810,7 @@
 </p:sld>
 </file>
 
-<file path=ppt/slides/slide8.xml><?xml version="1.0" encoding="utf-8"?>
+<file path=ppt/slides/slide7.xml><?xml version="1.0" encoding="utf-8"?>
 <p:sld xmlns:a="http://schemas.openxmlformats.org/drawingml/2006/main" xmlns:r="http://schemas.openxmlformats.org/officeDocument/2006/relationships" xmlns:p="http://schemas.openxmlformats.org/presentationml/2006/main">
   <p:cSld>
     <p:spTree>
@@ -4634,7 +4832,7 @@
           <p:cNvPr id="2" name="Title 1">
             <a:extLst>
               <a:ext uri="{FF2B5EF4-FFF2-40B4-BE49-F238E27FC236}">
-                <a16:creationId xmlns:a16="http://schemas.microsoft.com/office/drawing/2014/main" id="{97B03ACE-F50F-201E-FC0B-225A337B93A6}"/>
+                <a16:creationId xmlns:a16="http://schemas.microsoft.com/office/drawing/2014/main" id="{7B43F7C5-DEFA-B5D7-F0A6-BA90C50B4EFD}"/>
               </a:ext>
             </a:extLst>
           </p:cNvPr>
@@ -4647,8 +4845,256 @@
         </p:nvSpPr>
         <p:spPr>
           <a:xfrm>
-            <a:off x="838200" y="230214"/>
-            <a:ext cx="10515600" cy="579255"/>
+            <a:off x="838200" y="365126"/>
+            <a:ext cx="10515600" cy="704550"/>
+          </a:xfrm>
+        </p:spPr>
+        <p:txBody>
+          <a:bodyPr/>
+          <a:lstStyle/>
+          <a:p>
+            <a:r>
+              <a:rPr lang="en-IN" dirty="0"/>
+              <a:t>Further Enhancements</a:t>
+            </a:r>
+          </a:p>
+        </p:txBody>
+      </p:sp>
+      <p:sp>
+        <p:nvSpPr>
+          <p:cNvPr id="3" name="Content Placeholder 2">
+            <a:extLst>
+              <a:ext uri="{FF2B5EF4-FFF2-40B4-BE49-F238E27FC236}">
+                <a16:creationId xmlns:a16="http://schemas.microsoft.com/office/drawing/2014/main" id="{66FDDCB3-34F8-9029-7812-A603963B7750}"/>
+              </a:ext>
+            </a:extLst>
+          </p:cNvPr>
+          <p:cNvSpPr>
+            <a:spLocks noGrp="1"/>
+          </p:cNvSpPr>
+          <p:nvPr>
+            <p:ph idx="1"/>
+          </p:nvPr>
+        </p:nvSpPr>
+        <p:spPr>
+          <a:xfrm>
+            <a:off x="838200" y="1069676"/>
+            <a:ext cx="10515600" cy="5107287"/>
+          </a:xfrm>
+        </p:spPr>
+        <p:txBody>
+          <a:bodyPr>
+            <a:normAutofit lnSpcReduction="10000"/>
+          </a:bodyPr>
+          <a:lstStyle/>
+          <a:p>
+            <a:r>
+              <a:rPr lang="en-IN" dirty="0"/>
+              <a:t>Other parameter-efficient fine-tuning methods</a:t>
+            </a:r>
+          </a:p>
+          <a:p>
+            <a:pPr lvl="1"/>
+            <a:r>
+              <a:rPr lang="en-IN" dirty="0" err="1"/>
+              <a:t>LoRA</a:t>
+            </a:r>
+            <a:r>
+              <a:rPr lang="en-IN" dirty="0"/>
+              <a:t> methods. For e.g., </a:t>
+            </a:r>
+            <a:r>
+              <a:rPr lang="en-IN" dirty="0" err="1"/>
+              <a:t>DriveDitFit</a:t>
+            </a:r>
+            <a:r>
+              <a:rPr lang="en-IN" dirty="0"/>
+              <a:t>[3] suggested a </a:t>
+            </a:r>
+            <a:r>
+              <a:rPr lang="en-IN" dirty="0" err="1"/>
+              <a:t>LoRA</a:t>
+            </a:r>
+            <a:r>
+              <a:rPr lang="en-IN" dirty="0"/>
+              <a:t> method for tuning attention weights in </a:t>
+            </a:r>
+            <a:r>
+              <a:rPr lang="en-IN" dirty="0" err="1"/>
+              <a:t>DiT</a:t>
+            </a:r>
+            <a:endParaRPr lang="en-IN" dirty="0"/>
+          </a:p>
+          <a:p>
+            <a:pPr lvl="1"/>
+            <a:r>
+              <a:rPr lang="en-IN" dirty="0" err="1"/>
+              <a:t>DriveDitFit</a:t>
+            </a:r>
+            <a:r>
+              <a:rPr lang="en-IN" dirty="0"/>
+              <a:t> also suggested to initialize class embeddings with the nearest class embeddings from ImageNet, based on CLIP similarity (rather than the superficial label level similarity as we used)</a:t>
+            </a:r>
+          </a:p>
+          <a:p>
+            <a:r>
+              <a:rPr lang="en-IN" dirty="0" err="1"/>
+              <a:t>Dreambooth</a:t>
+            </a:r>
+            <a:r>
+              <a:rPr lang="en-IN" dirty="0"/>
+              <a:t> &amp; Textual Inversion [5,6]</a:t>
+            </a:r>
+          </a:p>
+          <a:p>
+            <a:pPr lvl="1"/>
+            <a:r>
+              <a:rPr lang="en-IN" dirty="0"/>
+              <a:t>Embed new concepts in the models space by introducing rare tokens. </a:t>
+            </a:r>
+            <a:br>
+              <a:rPr lang="en-IN" dirty="0"/>
+            </a:br>
+            <a:r>
+              <a:rPr lang="en-IN" dirty="0"/>
+              <a:t>e.g., </a:t>
+            </a:r>
+            <a:r>
+              <a:rPr lang="en-IN" dirty="0" err="1"/>
+              <a:t>sks_scratch</a:t>
+            </a:r>
+            <a:r>
+              <a:rPr lang="en-IN" dirty="0"/>
+              <a:t> for a scratch defect</a:t>
+            </a:r>
+          </a:p>
+          <a:p>
+            <a:r>
+              <a:rPr lang="en-IN" dirty="0"/>
+              <a:t>Leveraging additional information/annotations</a:t>
+            </a:r>
+          </a:p>
+          <a:p>
+            <a:pPr lvl="1"/>
+            <a:r>
+              <a:rPr lang="en-IN" dirty="0"/>
+              <a:t>ControlNet: Conditional generation with segmentation masks </a:t>
+            </a:r>
+          </a:p>
+          <a:p>
+            <a:r>
+              <a:rPr lang="en-IN" dirty="0"/>
+              <a:t>Classifier-free guidance tuning (not exposed in </a:t>
+            </a:r>
+            <a:r>
+              <a:rPr lang="en-IN" dirty="0" err="1"/>
+              <a:t>HuggingFace</a:t>
+            </a:r>
+            <a:r>
+              <a:rPr lang="en-IN" dirty="0"/>
+              <a:t> </a:t>
+            </a:r>
+            <a:r>
+              <a:rPr lang="en-IN" dirty="0" err="1"/>
+              <a:t>DiT</a:t>
+            </a:r>
+            <a:r>
+              <a:rPr lang="en-IN" dirty="0"/>
+              <a:t>)</a:t>
+            </a:r>
+          </a:p>
+          <a:p>
+            <a:r>
+              <a:rPr lang="en-IN" dirty="0"/>
+              <a:t>Knowledge distillation into smaller models</a:t>
+            </a:r>
+          </a:p>
+        </p:txBody>
+      </p:sp>
+    </p:spTree>
+    <p:extLst>
+      <p:ext uri="{BB962C8B-B14F-4D97-AF65-F5344CB8AC3E}">
+        <p14:creationId xmlns:p14="http://schemas.microsoft.com/office/powerpoint/2010/main" val="895154746"/>
+      </p:ext>
+    </p:extLst>
+  </p:cSld>
+  <p:clrMapOvr>
+    <a:masterClrMapping/>
+  </p:clrMapOvr>
+</p:sld>
+</file>
+
+<file path=ppt/slides/slide8.xml><?xml version="1.0" encoding="utf-8"?>
+<p:sld xmlns:a="http://schemas.openxmlformats.org/drawingml/2006/main" xmlns:r="http://schemas.openxmlformats.org/officeDocument/2006/relationships" xmlns:p="http://schemas.openxmlformats.org/presentationml/2006/main">
+  <p:cSld>
+    <p:bg>
+      <p:bgPr>
+        <a:gradFill>
+          <a:gsLst>
+            <a:gs pos="0">
+              <a:schemeClr val="accent1">
+                <a:lumMod val="5000"/>
+                <a:lumOff val="95000"/>
+              </a:schemeClr>
+            </a:gs>
+            <a:gs pos="74000">
+              <a:schemeClr val="accent1">
+                <a:lumMod val="45000"/>
+                <a:lumOff val="55000"/>
+              </a:schemeClr>
+            </a:gs>
+            <a:gs pos="83000">
+              <a:schemeClr val="accent1">
+                <a:lumMod val="45000"/>
+                <a:lumOff val="55000"/>
+              </a:schemeClr>
+            </a:gs>
+            <a:gs pos="100000">
+              <a:schemeClr val="accent1">
+                <a:lumMod val="30000"/>
+                <a:lumOff val="70000"/>
+              </a:schemeClr>
+            </a:gs>
+          </a:gsLst>
+          <a:lin ang="5400000" scaled="1"/>
+        </a:gradFill>
+        <a:effectLst/>
+      </p:bgPr>
+    </p:bg>
+    <p:spTree>
+      <p:nvGrpSpPr>
+        <p:cNvPr id="1" name=""/>
+        <p:cNvGrpSpPr/>
+        <p:nvPr/>
+      </p:nvGrpSpPr>
+      <p:grpSpPr>
+        <a:xfrm>
+          <a:off x="0" y="0"/>
+          <a:ext cx="0" cy="0"/>
+          <a:chOff x="0" y="0"/>
+          <a:chExt cx="0" cy="0"/>
+        </a:xfrm>
+      </p:grpSpPr>
+      <p:sp>
+        <p:nvSpPr>
+          <p:cNvPr id="2" name="Title 1">
+            <a:extLst>
+              <a:ext uri="{FF2B5EF4-FFF2-40B4-BE49-F238E27FC236}">
+                <a16:creationId xmlns:a16="http://schemas.microsoft.com/office/drawing/2014/main" id="{36E658C3-3986-6496-E4E7-01E41DC0CAD9}"/>
+              </a:ext>
+            </a:extLst>
+          </p:cNvPr>
+          <p:cNvSpPr>
+            <a:spLocks noGrp="1"/>
+          </p:cNvSpPr>
+          <p:nvPr>
+            <p:ph type="title"/>
+          </p:nvPr>
+        </p:nvSpPr>
+        <p:spPr>
+          <a:xfrm>
+            <a:off x="838200" y="86792"/>
+            <a:ext cx="10515600" cy="594245"/>
           </a:xfrm>
         </p:spPr>
         <p:txBody>
@@ -4659,7 +5105,7 @@
           <a:p>
             <a:r>
               <a:rPr lang="en-IN" dirty="0"/>
-              <a:t>Textual Inversion</a:t>
+              <a:t>How to leverage segmentation masks?</a:t>
             </a:r>
           </a:p>
         </p:txBody>
@@ -4669,7 +5115,7 @@
           <p:cNvPr id="3" name="Content Placeholder 2">
             <a:extLst>
               <a:ext uri="{FF2B5EF4-FFF2-40B4-BE49-F238E27FC236}">
-                <a16:creationId xmlns:a16="http://schemas.microsoft.com/office/drawing/2014/main" id="{F87B6436-2C11-396B-EEBB-F60EB63AD601}"/>
+                <a16:creationId xmlns:a16="http://schemas.microsoft.com/office/drawing/2014/main" id="{060FCC2C-2BA4-3C01-2782-D987DDBA4086}"/>
               </a:ext>
             </a:extLst>
           </p:cNvPr>
@@ -4682,22 +5128,90 @@
         </p:nvSpPr>
         <p:spPr>
           <a:xfrm>
-            <a:off x="838200" y="989351"/>
-            <a:ext cx="10515600" cy="5187612"/>
+            <a:off x="838200" y="869430"/>
+            <a:ext cx="10515600" cy="5307533"/>
           </a:xfrm>
         </p:spPr>
         <p:txBody>
           <a:bodyPr/>
           <a:lstStyle/>
           <a:p>
-            <a:endParaRPr lang="en-IN" dirty="0"/>
+            <a:r>
+              <a:rPr lang="en-IN" dirty="0"/>
+              <a:t>Pass the segmentation </a:t>
+            </a:r>
+            <a:r>
+              <a:rPr lang="en-IN" dirty="0" err="1"/>
+              <a:t>maks</a:t>
+            </a:r>
+            <a:r>
+              <a:rPr lang="en-IN" dirty="0"/>
+              <a:t> as extra conditioning information to a suitable architecture such as ControlNet</a:t>
+            </a:r>
+          </a:p>
+          <a:p>
+            <a:pPr lvl="1"/>
+            <a:r>
+              <a:rPr lang="en-IN" dirty="0"/>
+              <a:t>Pass the conditioning image through a parallel convolution network, and inject the features into the main network with residual connections</a:t>
+            </a:r>
+          </a:p>
+          <a:p>
+            <a:r>
+              <a:rPr lang="en-IN" dirty="0"/>
+              <a:t>Add class-conditioning mechanism to ControlNet</a:t>
+            </a:r>
+          </a:p>
+          <a:p>
+            <a:pPr lvl="1"/>
+            <a:r>
+              <a:rPr lang="en-IN" dirty="0"/>
+              <a:t>Can pass the class-embedding to </a:t>
+            </a:r>
+            <a:r>
+              <a:rPr lang="en-IN" dirty="0" err="1"/>
+              <a:t>Unet</a:t>
+            </a:r>
+            <a:r>
+              <a:rPr lang="en-IN" dirty="0"/>
+              <a:t> blocks (e.g. add to the timestep embedding)</a:t>
+            </a:r>
+          </a:p>
+          <a:p>
+            <a:pPr lvl="1"/>
+            <a:r>
+              <a:rPr lang="en-IN" dirty="0"/>
+              <a:t>Alternatively, can append the class embedding as an extra channel in the segmentation mask (with suitable </a:t>
+            </a:r>
+            <a:r>
+              <a:rPr lang="en-IN" dirty="0" err="1"/>
+              <a:t>projection+reshaping</a:t>
+            </a:r>
+            <a:r>
+              <a:rPr lang="en-IN" dirty="0"/>
+              <a:t>)</a:t>
+            </a:r>
+          </a:p>
+          <a:p>
+            <a:pPr lvl="1"/>
+            <a:r>
+              <a:rPr lang="en-IN" dirty="0"/>
+              <a:t>Represent the class label as a text prompt (e.g., “a screw with crack”) and use text-conditional ControlNet – combine guidance from both</a:t>
+            </a:r>
+          </a:p>
+          <a:p>
+            <a:pPr lvl="1"/>
+            <a:r>
+              <a:rPr lang="en-IN" dirty="0"/>
+              <a:t>Classifier-free guidance could be used to guide the sampling process (also need conditioning drop-out during training)</a:t>
+            </a:r>
           </a:p>
         </p:txBody>
       </p:sp>
     </p:spTree>
     <p:extLst>
       <p:ext uri="{BB962C8B-B14F-4D97-AF65-F5344CB8AC3E}">
-        <p14:creationId xmlns:p14="http://schemas.microsoft.com/office/powerpoint/2010/main" val="3628067294"/>
+        <p14:creationId xmlns:p14="http://schemas.microsoft.com/office/powerpoint/2010/main" val="551709318"/>
       </p:ext>
     </p:extLst>
   </p:cSld>
@@ -4729,7 +5243,7 @@
           <p:cNvPr id="2" name="Title 1">
             <a:extLst>
               <a:ext uri="{FF2B5EF4-FFF2-40B4-BE49-F238E27FC236}">
-                <a16:creationId xmlns:a16="http://schemas.microsoft.com/office/drawing/2014/main" id="{3E6E1A3D-D515-5197-3017-1A59273BE890}"/>
+                <a16:creationId xmlns:a16="http://schemas.microsoft.com/office/drawing/2014/main" id="{97B03ACE-F50F-201E-FC0B-225A337B93A6}"/>
               </a:ext>
             </a:extLst>
           </p:cNvPr>
@@ -4742,8 +5256,8 @@
         </p:nvSpPr>
         <p:spPr>
           <a:xfrm>
-            <a:off x="838200" y="146752"/>
-            <a:ext cx="10515600" cy="534285"/>
+            <a:off x="838200" y="230214"/>
+            <a:ext cx="10515600" cy="579255"/>
           </a:xfrm>
         </p:spPr>
         <p:txBody>
@@ -4754,7 +5268,7 @@
           <a:p>
             <a:r>
               <a:rPr lang="en-IN" dirty="0"/>
-              <a:t>References</a:t>
+              <a:t>Textual Inversion</a:t>
             </a:r>
           </a:p>
         </p:txBody>
@@ -4764,7 +5278,7 @@
           <p:cNvPr id="3" name="Content Placeholder 2">
             <a:extLst>
               <a:ext uri="{FF2B5EF4-FFF2-40B4-BE49-F238E27FC236}">
-                <a16:creationId xmlns:a16="http://schemas.microsoft.com/office/drawing/2014/main" id="{8922B313-DA68-C9B3-0FA9-B9B7A2B4DAB7}"/>
+                <a16:creationId xmlns:a16="http://schemas.microsoft.com/office/drawing/2014/main" id="{F87B6436-2C11-396B-EEBB-F60EB63AD601}"/>
               </a:ext>
             </a:extLst>
           </p:cNvPr>
@@ -4777,361 +5291,22 @@
         </p:nvSpPr>
         <p:spPr>
           <a:xfrm>
-            <a:off x="838200" y="854439"/>
-            <a:ext cx="10515600" cy="5322524"/>
+            <a:off x="838200" y="989351"/>
+            <a:ext cx="10515600" cy="5187612"/>
           </a:xfrm>
         </p:spPr>
         <p:txBody>
-          <a:bodyPr>
-            <a:normAutofit/>
-          </a:bodyPr>
-          <a:lstStyle/>
-          <a:p>
-            <a:pPr marL="0" indent="0">
-              <a:buNone/>
-            </a:pPr>
-            <a:r>
-              <a:rPr lang="en-IN" sz="1800" dirty="0">
-                <a:solidFill>
-                  <a:srgbClr val="333333"/>
-                </a:solidFill>
-                <a:latin typeface="Arial" panose="020B0604020202020204" pitchFamily="34" charset="0"/>
-              </a:rPr>
-              <a:t>[1] </a:t>
-            </a:r>
-            <a:r>
-              <a:rPr lang="en-IN" sz="1800" dirty="0" err="1">
-                <a:solidFill>
-                  <a:srgbClr val="333333"/>
-                </a:solidFill>
-                <a:latin typeface="Arial" panose="020B0604020202020204" pitchFamily="34" charset="0"/>
-              </a:rPr>
-              <a:t>Menglin</a:t>
-            </a:r>
-            <a:r>
-              <a:rPr lang="en-IN" sz="1800" dirty="0">
-                <a:solidFill>
-                  <a:srgbClr val="333333"/>
-                </a:solidFill>
-                <a:latin typeface="Arial" panose="020B0604020202020204" pitchFamily="34" charset="0"/>
-              </a:rPr>
-              <a:t> Jia et al. Visual prompt tuning. ECCV, 2022.</a:t>
-            </a:r>
-            <a:br>
-              <a:rPr lang="en-IN" sz="1800" dirty="0">
-                <a:solidFill>
-                  <a:srgbClr val="333333"/>
-                </a:solidFill>
-                <a:latin typeface="Arial" panose="020B0604020202020204" pitchFamily="34" charset="0"/>
-              </a:rPr>
-            </a:br>
-            <a:r>
-              <a:rPr lang="en-IN" sz="1800" dirty="0">
-                <a:solidFill>
-                  <a:srgbClr val="333333"/>
-                </a:solidFill>
-                <a:latin typeface="Arial" panose="020B0604020202020204" pitchFamily="34" charset="0"/>
-              </a:rPr>
-              <a:t>[2] Edward J Hu et al. </a:t>
-            </a:r>
-            <a:r>
-              <a:rPr lang="en-IN" sz="1800" dirty="0" err="1">
-                <a:solidFill>
-                  <a:srgbClr val="333333"/>
-                </a:solidFill>
-                <a:latin typeface="Arial" panose="020B0604020202020204" pitchFamily="34" charset="0"/>
-              </a:rPr>
-              <a:t>LoRA</a:t>
-            </a:r>
-            <a:r>
-              <a:rPr lang="en-IN" sz="1800" dirty="0">
-                <a:solidFill>
-                  <a:srgbClr val="333333"/>
-                </a:solidFill>
-                <a:latin typeface="Arial" panose="020B0604020202020204" pitchFamily="34" charset="0"/>
-              </a:rPr>
-              <a:t>: Low-rank adaptation of large language models. ICLR, 2022.</a:t>
-            </a:r>
-            <a:br>
-              <a:rPr lang="en-IN" sz="1800" dirty="0">
-                <a:solidFill>
-                  <a:srgbClr val="333333"/>
-                </a:solidFill>
-                <a:latin typeface="Arial" panose="020B0604020202020204" pitchFamily="34" charset="0"/>
-              </a:rPr>
-            </a:br>
-            <a:r>
-              <a:rPr lang="en-IN" sz="1800" dirty="0">
-                <a:solidFill>
-                  <a:srgbClr val="333333"/>
-                </a:solidFill>
-                <a:latin typeface="Arial" panose="020B0604020202020204" pitchFamily="34" charset="0"/>
-              </a:rPr>
-              <a:t>[3] </a:t>
-            </a:r>
-            <a:r>
-              <a:rPr lang="en-IN" sz="1800" dirty="0" err="1">
-                <a:solidFill>
-                  <a:srgbClr val="333333"/>
-                </a:solidFill>
-                <a:latin typeface="Arial" panose="020B0604020202020204" pitchFamily="34" charset="0"/>
-              </a:rPr>
-              <a:t>Jiahang</a:t>
-            </a:r>
-            <a:r>
-              <a:rPr lang="en-IN" sz="1800" dirty="0">
-                <a:solidFill>
-                  <a:srgbClr val="333333"/>
-                </a:solidFill>
-                <a:latin typeface="Arial" panose="020B0604020202020204" pitchFamily="34" charset="0"/>
-              </a:rPr>
-              <a:t> Tu et al. </a:t>
-            </a:r>
-            <a:r>
-              <a:rPr lang="en-IN" sz="1800" dirty="0" err="1">
-                <a:solidFill>
-                  <a:srgbClr val="333333"/>
-                </a:solidFill>
-                <a:latin typeface="Arial" panose="020B0604020202020204" pitchFamily="34" charset="0"/>
-              </a:rPr>
-              <a:t>DriveDitFit</a:t>
-            </a:r>
-            <a:r>
-              <a:rPr lang="en-IN" sz="1800" dirty="0">
-                <a:solidFill>
-                  <a:srgbClr val="333333"/>
-                </a:solidFill>
-                <a:latin typeface="Arial" panose="020B0604020202020204" pitchFamily="34" charset="0"/>
-              </a:rPr>
-              <a:t>: Fine-tuning diffusion transformers for autonomous driving data generation. ACM TOMM, 2025.</a:t>
-            </a:r>
-            <a:br>
-              <a:rPr lang="en-IN" sz="1800" dirty="0">
-                <a:solidFill>
-                  <a:srgbClr val="333333"/>
-                </a:solidFill>
-                <a:latin typeface="Arial" panose="020B0604020202020204" pitchFamily="34" charset="0"/>
-              </a:rPr>
-            </a:br>
-            <a:r>
-              <a:rPr lang="en-IN" sz="1800" dirty="0">
-                <a:solidFill>
-                  <a:srgbClr val="333333"/>
-                </a:solidFill>
-                <a:latin typeface="Arial" panose="020B0604020202020204" pitchFamily="34" charset="0"/>
-              </a:rPr>
-              <a:t>[4] Enze Xie et al. </a:t>
-            </a:r>
-            <a:r>
-              <a:rPr lang="en-IN" sz="1800" dirty="0" err="1">
-                <a:solidFill>
-                  <a:srgbClr val="333333"/>
-                </a:solidFill>
-                <a:latin typeface="Arial" panose="020B0604020202020204" pitchFamily="34" charset="0"/>
-              </a:rPr>
-              <a:t>DiffFit</a:t>
-            </a:r>
-            <a:r>
-              <a:rPr lang="en-IN" sz="1800" dirty="0">
-                <a:solidFill>
-                  <a:srgbClr val="333333"/>
-                </a:solidFill>
-                <a:latin typeface="Arial" panose="020B0604020202020204" pitchFamily="34" charset="0"/>
-              </a:rPr>
-              <a:t>: Unlocking transferability of large diffusion models via simple parameter-efficient fine-tuning. ICCV, 2023.</a:t>
-            </a:r>
-            <a:br>
-              <a:rPr lang="en-IN" sz="1800" dirty="0">
-                <a:solidFill>
-                  <a:srgbClr val="333333"/>
-                </a:solidFill>
-                <a:latin typeface="Arial" panose="020B0604020202020204" pitchFamily="34" charset="0"/>
-              </a:rPr>
-            </a:br>
-            <a:r>
-              <a:rPr lang="en-IN" sz="1800" dirty="0">
-                <a:solidFill>
-                  <a:srgbClr val="333333"/>
-                </a:solidFill>
-                <a:latin typeface="Arial" panose="020B0604020202020204" pitchFamily="34" charset="0"/>
-              </a:rPr>
-              <a:t>[5] Nataniel Ruiz et al. </a:t>
-            </a:r>
-            <a:r>
-              <a:rPr lang="en-IN" sz="1800" dirty="0" err="1">
-                <a:solidFill>
-                  <a:srgbClr val="333333"/>
-                </a:solidFill>
-                <a:latin typeface="Arial" panose="020B0604020202020204" pitchFamily="34" charset="0"/>
-              </a:rPr>
-              <a:t>Dreambooth</a:t>
-            </a:r>
-            <a:r>
-              <a:rPr lang="en-IN" sz="1800" dirty="0">
-                <a:solidFill>
-                  <a:srgbClr val="333333"/>
-                </a:solidFill>
-                <a:latin typeface="Arial" panose="020B0604020202020204" pitchFamily="34" charset="0"/>
-              </a:rPr>
-              <a:t>: Fine-tuning text-to-image diffusion models for subject-driven generation, 2022.</a:t>
-            </a:r>
-            <a:br>
-              <a:rPr lang="en-IN" sz="1800" dirty="0">
-                <a:solidFill>
-                  <a:srgbClr val="333333"/>
-                </a:solidFill>
-                <a:latin typeface="Arial" panose="020B0604020202020204" pitchFamily="34" charset="0"/>
-              </a:rPr>
-            </a:br>
-            <a:r>
-              <a:rPr lang="en-IN" sz="1800" dirty="0">
-                <a:solidFill>
-                  <a:srgbClr val="333333"/>
-                </a:solidFill>
-                <a:latin typeface="Arial" panose="020B0604020202020204" pitchFamily="34" charset="0"/>
-              </a:rPr>
-              <a:t>[6] Rinon Gal et al. An image is worth one word: Personalizing text-to-image generation using textual inversion, 2022.</a:t>
-            </a:r>
-            <a:br>
-              <a:rPr lang="en-IN" sz="1800" dirty="0">
-                <a:solidFill>
-                  <a:srgbClr val="333333"/>
-                </a:solidFill>
-                <a:latin typeface="Arial" panose="020B0604020202020204" pitchFamily="34" charset="0"/>
-              </a:rPr>
-            </a:br>
-            <a:r>
-              <a:rPr lang="en-IN" sz="1800" dirty="0">
-                <a:solidFill>
-                  <a:srgbClr val="333333"/>
-                </a:solidFill>
-                <a:latin typeface="Arial" panose="020B0604020202020204" pitchFamily="34" charset="0"/>
-              </a:rPr>
-              <a:t>[7] </a:t>
-            </a:r>
-            <a:r>
-              <a:rPr lang="en-IN" sz="1800" dirty="0" err="1">
-                <a:solidFill>
-                  <a:srgbClr val="333333"/>
-                </a:solidFill>
-                <a:latin typeface="Arial" panose="020B0604020202020204" pitchFamily="34" charset="0"/>
-              </a:rPr>
-              <a:t>Lvmin</a:t>
-            </a:r>
-            <a:r>
-              <a:rPr lang="en-IN" sz="1800" dirty="0">
-                <a:solidFill>
-                  <a:srgbClr val="333333"/>
-                </a:solidFill>
-                <a:latin typeface="Arial" panose="020B0604020202020204" pitchFamily="34" charset="0"/>
-              </a:rPr>
-              <a:t> Zhang et al. Adding conditional control to text-to-image diffusion models.</a:t>
-            </a:r>
-          </a:p>
-          <a:p>
-            <a:pPr marL="0" indent="0">
-              <a:buNone/>
-            </a:pPr>
-            <a:r>
-              <a:rPr lang="en-IN" sz="1800" dirty="0">
-                <a:solidFill>
-                  <a:srgbClr val="333333"/>
-                </a:solidFill>
-                <a:latin typeface="Arial" panose="020B0604020202020204" pitchFamily="34" charset="0"/>
-              </a:rPr>
-              <a:t>[8] Elad Ben Zaken et al. </a:t>
-            </a:r>
-            <a:r>
-              <a:rPr lang="en-IN" sz="1800" dirty="0" err="1">
-                <a:solidFill>
-                  <a:srgbClr val="333333"/>
-                </a:solidFill>
-                <a:latin typeface="Arial" panose="020B0604020202020204" pitchFamily="34" charset="0"/>
-              </a:rPr>
-              <a:t>BitFit</a:t>
-            </a:r>
-            <a:r>
-              <a:rPr lang="en-IN" sz="1800" dirty="0">
-                <a:solidFill>
-                  <a:srgbClr val="333333"/>
-                </a:solidFill>
-                <a:latin typeface="Arial" panose="020B0604020202020204" pitchFamily="34" charset="0"/>
-              </a:rPr>
-              <a:t>: Simple parameter-efficient fine-tuning for transformer-based masked language models. ACL 2022.</a:t>
-            </a:r>
-          </a:p>
-          <a:p>
-            <a:pPr marL="0" indent="0">
-              <a:buNone/>
-            </a:pPr>
-            <a:r>
-              <a:rPr lang="en-IN" sz="1800" dirty="0">
-                <a:solidFill>
-                  <a:srgbClr val="333333"/>
-                </a:solidFill>
-                <a:latin typeface="Arial" panose="020B0604020202020204" pitchFamily="34" charset="0"/>
-              </a:rPr>
-              <a:t>[9] </a:t>
-            </a:r>
-            <a:r>
-              <a:rPr lang="en-IN" sz="1800" b="0" i="0" dirty="0">
-                <a:solidFill>
-                  <a:srgbClr val="333333"/>
-                </a:solidFill>
-                <a:effectLst/>
-                <a:latin typeface="Arial" panose="020B0604020202020204" pitchFamily="34" charset="0"/>
-              </a:rPr>
-              <a:t>R. Zhang, P. Isola, A. A. Efros, E. Shechtman and O. Wang, "The Unreasonable Effectiveness of Deep Features as a Perceptual Metric," in 2018 IEEE/CVF Conference on Computer Vision and Pattern Recognition (CVPR</a:t>
-            </a:r>
-          </a:p>
-          <a:p>
-            <a:pPr marL="0" indent="0">
-              <a:buNone/>
-            </a:pPr>
-            <a:r>
-              <a:rPr lang="en-IN" sz="1800" dirty="0">
-                <a:solidFill>
-                  <a:srgbClr val="333333"/>
-                </a:solidFill>
-                <a:latin typeface="Arial" panose="020B0604020202020204" pitchFamily="34" charset="0"/>
-              </a:rPr>
-              <a:t>[10]</a:t>
-            </a:r>
-            <a:r>
-              <a:rPr lang="en-US" sz="1800" dirty="0">
-                <a:solidFill>
-                  <a:srgbClr val="333333"/>
-                </a:solidFill>
-                <a:latin typeface="Arial" panose="020B0604020202020204" pitchFamily="34" charset="0"/>
-              </a:rPr>
-              <a:t>Wang, Z. &amp; Simoncelli, Eero &amp; </a:t>
-            </a:r>
-            <a:r>
-              <a:rPr lang="en-US" sz="1800" dirty="0" err="1">
-                <a:solidFill>
-                  <a:srgbClr val="333333"/>
-                </a:solidFill>
-                <a:latin typeface="Arial" panose="020B0604020202020204" pitchFamily="34" charset="0"/>
-              </a:rPr>
-              <a:t>Bovik</a:t>
-            </a:r>
-            <a:r>
-              <a:rPr lang="en-US" sz="1800" dirty="0">
-                <a:solidFill>
-                  <a:srgbClr val="333333"/>
-                </a:solidFill>
-                <a:latin typeface="Arial" panose="020B0604020202020204" pitchFamily="34" charset="0"/>
-              </a:rPr>
-              <a:t>, Alan. (2003). Multiscale structural similarity for image quality assessment. Conference Record of the Asilomar Conference on Signals, Systems and Computers. 2. 1398 - 1402 Vol.2. 10.1109/ACSSC.2003.1292216. </a:t>
-            </a:r>
-            <a:endParaRPr lang="en-IN" sz="1800" dirty="0"/>
+          <a:bodyPr/>
+          <a:lstStyle/>
+          <a:p>
+            <a:endParaRPr lang="en-IN" dirty="0"/>
           </a:p>
         </p:txBody>
       </p:sp>
     </p:spTree>
     <p:extLst>
       <p:ext uri="{BB962C8B-B14F-4D97-AF65-F5344CB8AC3E}">
-        <p14:creationId xmlns:p14="http://schemas.microsoft.com/office/powerpoint/2010/main" val="3695217793"/>
+        <p14:creationId xmlns:p14="http://schemas.microsoft.com/office/powerpoint/2010/main" val="3628067294"/>
       </p:ext>
     </p:extLst>
   </p:cSld>

</xml_diff>